<commit_message>
more planning based off of prototyping
In between commits I prototyped some pyqt demos using networking and found due to the need to return to the event loop while True: loops (which are needed for networking) break the ui
</commit_message>
<xml_diff>
--- a/other/dev log.pptx
+++ b/other/dev log.pptx
@@ -48,7 +48,8 @@
     <p:sldId id="287" r:id="rId42"/>
     <p:sldId id="290" r:id="rId43"/>
     <p:sldId id="300" r:id="rId44"/>
-    <p:sldId id="289" r:id="rId45"/>
+    <p:sldId id="301" r:id="rId45"/>
+    <p:sldId id="289" r:id="rId46"/>
   </p:sldIdLst>
   <p:sldSz cx="12192000" cy="6858000"/>
   <p:notesSz cx="6858000" cy="9144000"/>
@@ -213,6 +214,11 @@
             <p14:sldId id="300"/>
           </p14:sldIdLst>
         </p14:section>
+        <p14:section name="User interface/front end" id="{7F7CDCB5-50B3-4F98-93FA-A701A980199A}">
+          <p14:sldIdLst>
+            <p14:sldId id="301"/>
+          </p14:sldIdLst>
+        </p14:section>
         <p14:section name="password/encryption" id="{777C459F-DCA0-4D8A-A8E2-379703C0BB6F}">
           <p14:sldIdLst>
             <p14:sldId id="289"/>
@@ -376,7 +382,7 @@
           <a:p>
             <a:fld id="{95BB3272-C847-43E3-AE34-83B2109F1449}" type="datetimeFigureOut">
               <a:rPr lang="en-GB" smtClean="0"/>
-              <a:t>09/07/2020</a:t>
+              <a:t>21/07/2020</a:t>
             </a:fld>
             <a:endParaRPr lang="en-GB"/>
           </a:p>
@@ -576,7 +582,7 @@
           <a:p>
             <a:fld id="{95BB3272-C847-43E3-AE34-83B2109F1449}" type="datetimeFigureOut">
               <a:rPr lang="en-GB" smtClean="0"/>
-              <a:t>09/07/2020</a:t>
+              <a:t>21/07/2020</a:t>
             </a:fld>
             <a:endParaRPr lang="en-GB"/>
           </a:p>
@@ -786,7 +792,7 @@
           <a:p>
             <a:fld id="{95BB3272-C847-43E3-AE34-83B2109F1449}" type="datetimeFigureOut">
               <a:rPr lang="en-GB" smtClean="0"/>
-              <a:t>09/07/2020</a:t>
+              <a:t>21/07/2020</a:t>
             </a:fld>
             <a:endParaRPr lang="en-GB"/>
           </a:p>
@@ -986,7 +992,7 @@
           <a:p>
             <a:fld id="{95BB3272-C847-43E3-AE34-83B2109F1449}" type="datetimeFigureOut">
               <a:rPr lang="en-GB" smtClean="0"/>
-              <a:t>09/07/2020</a:t>
+              <a:t>21/07/2020</a:t>
             </a:fld>
             <a:endParaRPr lang="en-GB"/>
           </a:p>
@@ -1262,7 +1268,7 @@
           <a:p>
             <a:fld id="{95BB3272-C847-43E3-AE34-83B2109F1449}" type="datetimeFigureOut">
               <a:rPr lang="en-GB" smtClean="0"/>
-              <a:t>09/07/2020</a:t>
+              <a:t>21/07/2020</a:t>
             </a:fld>
             <a:endParaRPr lang="en-GB"/>
           </a:p>
@@ -1530,7 +1536,7 @@
           <a:p>
             <a:fld id="{95BB3272-C847-43E3-AE34-83B2109F1449}" type="datetimeFigureOut">
               <a:rPr lang="en-GB" smtClean="0"/>
-              <a:t>09/07/2020</a:t>
+              <a:t>21/07/2020</a:t>
             </a:fld>
             <a:endParaRPr lang="en-GB"/>
           </a:p>
@@ -1945,7 +1951,7 @@
           <a:p>
             <a:fld id="{95BB3272-C847-43E3-AE34-83B2109F1449}" type="datetimeFigureOut">
               <a:rPr lang="en-GB" smtClean="0"/>
-              <a:t>09/07/2020</a:t>
+              <a:t>21/07/2020</a:t>
             </a:fld>
             <a:endParaRPr lang="en-GB"/>
           </a:p>
@@ -2087,7 +2093,7 @@
           <a:p>
             <a:fld id="{95BB3272-C847-43E3-AE34-83B2109F1449}" type="datetimeFigureOut">
               <a:rPr lang="en-GB" smtClean="0"/>
-              <a:t>09/07/2020</a:t>
+              <a:t>21/07/2020</a:t>
             </a:fld>
             <a:endParaRPr lang="en-GB"/>
           </a:p>
@@ -2200,7 +2206,7 @@
           <a:p>
             <a:fld id="{95BB3272-C847-43E3-AE34-83B2109F1449}" type="datetimeFigureOut">
               <a:rPr lang="en-GB" smtClean="0"/>
-              <a:t>09/07/2020</a:t>
+              <a:t>21/07/2020</a:t>
             </a:fld>
             <a:endParaRPr lang="en-GB"/>
           </a:p>
@@ -2513,7 +2519,7 @@
           <a:p>
             <a:fld id="{95BB3272-C847-43E3-AE34-83B2109F1449}" type="datetimeFigureOut">
               <a:rPr lang="en-GB" smtClean="0"/>
-              <a:t>09/07/2020</a:t>
+              <a:t>21/07/2020</a:t>
             </a:fld>
             <a:endParaRPr lang="en-GB"/>
           </a:p>
@@ -2802,7 +2808,7 @@
           <a:p>
             <a:fld id="{95BB3272-C847-43E3-AE34-83B2109F1449}" type="datetimeFigureOut">
               <a:rPr lang="en-GB" smtClean="0"/>
-              <a:t>09/07/2020</a:t>
+              <a:t>21/07/2020</a:t>
             </a:fld>
             <a:endParaRPr lang="en-GB"/>
           </a:p>
@@ -3045,7 +3051,7 @@
           <a:p>
             <a:fld id="{95BB3272-C847-43E3-AE34-83B2109F1449}" type="datetimeFigureOut">
               <a:rPr lang="en-GB" smtClean="0"/>
-              <a:t>09/07/2020</a:t>
+              <a:t>21/07/2020</a:t>
             </a:fld>
             <a:endParaRPr lang="en-GB"/>
           </a:p>
@@ -9040,6 +9046,114 @@
           <p:cNvPr id="2" name="Title 1">
             <a:extLst>
               <a:ext uri="{FF2B5EF4-FFF2-40B4-BE49-F238E27FC236}">
+                <a16:creationId xmlns:a16="http://schemas.microsoft.com/office/drawing/2014/main" id="{1268F0D7-E502-4671-80F8-D61B4A5FF414}"/>
+              </a:ext>
+            </a:extLst>
+          </p:cNvPr>
+          <p:cNvSpPr>
+            <a:spLocks noGrp="1"/>
+          </p:cNvSpPr>
+          <p:nvPr>
+            <p:ph type="title"/>
+          </p:nvPr>
+        </p:nvSpPr>
+        <p:spPr/>
+        <p:txBody>
+          <a:bodyPr/>
+          <a:lstStyle/>
+          <a:p>
+            <a:r>
+              <a:rPr lang="en-GB" dirty="0"/>
+              <a:t>pygame</a:t>
+            </a:r>
+          </a:p>
+        </p:txBody>
+      </p:sp>
+      <p:sp>
+        <p:nvSpPr>
+          <p:cNvPr id="3" name="Content Placeholder 2">
+            <a:extLst>
+              <a:ext uri="{FF2B5EF4-FFF2-40B4-BE49-F238E27FC236}">
+                <a16:creationId xmlns:a16="http://schemas.microsoft.com/office/drawing/2014/main" id="{32742E73-BF5A-44F0-8C9B-3EF1E69B235E}"/>
+              </a:ext>
+            </a:extLst>
+          </p:cNvPr>
+          <p:cNvSpPr>
+            <a:spLocks noGrp="1"/>
+          </p:cNvSpPr>
+          <p:nvPr>
+            <p:ph idx="1"/>
+          </p:nvPr>
+        </p:nvSpPr>
+        <p:spPr/>
+        <p:txBody>
+          <a:bodyPr/>
+          <a:lstStyle/>
+          <a:p>
+            <a:r>
+              <a:rPr lang="en-GB" dirty="0"/>
+              <a:t>Due to how the event loop and image handling works in pyQT a separate pygame application may be the best solution, there is precedent for this in actual games and applications such as “</a:t>
+            </a:r>
+            <a:r>
+              <a:rPr lang="en-GB" dirty="0" err="1"/>
+              <a:t>assetto</a:t>
+            </a:r>
+            <a:r>
+              <a:rPr lang="en-GB" dirty="0"/>
+              <a:t> </a:t>
+            </a:r>
+            <a:r>
+              <a:rPr lang="en-GB" dirty="0" err="1"/>
+              <a:t>corsa</a:t>
+            </a:r>
+            <a:r>
+              <a:rPr lang="en-GB" dirty="0"/>
+              <a:t>” or any game with a  launcher</a:t>
+            </a:r>
+          </a:p>
+          <a:p>
+            <a:r>
+              <a:rPr lang="en-GB" dirty="0"/>
+              <a:t>This can be launched from a module using parameters from the main application, maybe have it write to local files so that pyQT can them read it when the game finishes</a:t>
+            </a:r>
+          </a:p>
+        </p:txBody>
+      </p:sp>
+    </p:spTree>
+    <p:extLst>
+      <p:ext uri="{BB962C8B-B14F-4D97-AF65-F5344CB8AC3E}">
+        <p14:creationId xmlns:p14="http://schemas.microsoft.com/office/powerpoint/2010/main" val="3561498456"/>
+      </p:ext>
+    </p:extLst>
+  </p:cSld>
+  <p:clrMapOvr>
+    <a:masterClrMapping/>
+  </p:clrMapOvr>
+</p:sld>
+</file>
+
+<file path=ppt/slides/slide45.xml><?xml version="1.0" encoding="utf-8"?>
+<p:sld xmlns:a="http://schemas.openxmlformats.org/drawingml/2006/main" xmlns:r="http://schemas.openxmlformats.org/officeDocument/2006/relationships" xmlns:p="http://schemas.openxmlformats.org/presentationml/2006/main">
+  <p:cSld>
+    <p:spTree>
+      <p:nvGrpSpPr>
+        <p:cNvPr id="1" name=""/>
+        <p:cNvGrpSpPr/>
+        <p:nvPr/>
+      </p:nvGrpSpPr>
+      <p:grpSpPr>
+        <a:xfrm>
+          <a:off x="0" y="0"/>
+          <a:ext cx="0" cy="0"/>
+          <a:chOff x="0" y="0"/>
+          <a:chExt cx="0" cy="0"/>
+        </a:xfrm>
+      </p:grpSpPr>
+      <p:sp>
+        <p:nvSpPr>
+          <p:cNvPr id="2" name="Title 1">
+            <a:extLst>
+              <a:ext uri="{FF2B5EF4-FFF2-40B4-BE49-F238E27FC236}">
                 <a16:creationId xmlns:a16="http://schemas.microsoft.com/office/drawing/2014/main" id="{8C420C27-33F0-478B-B5E0-A092E635F2D0}"/>
               </a:ext>
             </a:extLst>

</xml_diff>